<commit_message>
Car sound mode added. Documentation updated.
</commit_message>
<xml_diff>
--- a/doc/SoundGeneratorPoC.pptx
+++ b/doc/SoundGeneratorPoC.pptx
@@ -7,9 +7,12 @@
   <p:sldIdLst>
     <p:sldId id="257" r:id="rId2"/>
     <p:sldId id="258" r:id="rId3"/>
-    <p:sldId id="259" r:id="rId4"/>
-    <p:sldId id="261" r:id="rId5"/>
-    <p:sldId id="260" r:id="rId6"/>
+    <p:sldId id="263" r:id="rId4"/>
+    <p:sldId id="264" r:id="rId5"/>
+    <p:sldId id="259" r:id="rId6"/>
+    <p:sldId id="262" r:id="rId7"/>
+    <p:sldId id="261" r:id="rId8"/>
+    <p:sldId id="260" r:id="rId9"/>
   </p:sldIdLst>
   <p:sldSz cx="12192000" cy="6858000"/>
   <p:notesSz cx="6858000" cy="9144000"/>
@@ -3849,7 +3852,10 @@
           <a:bodyPr/>
           <a:lstStyle/>
           <a:p>
-            <a:endParaRPr lang="en-GB"/>
+            <a:r>
+              <a:rPr lang="en-GB" dirty="0"/>
+              <a:t>08.2021</a:t>
+            </a:r>
           </a:p>
         </p:txBody>
       </p:sp>
@@ -3874,7 +3880,10 @@
           <a:bodyPr/>
           <a:lstStyle/>
           <a:p>
-            <a:endParaRPr lang="en-GB"/>
+            <a:r>
+              <a:rPr lang="en-GB" dirty="0"/>
+              <a:t>Mark Wendler</a:t>
+            </a:r>
           </a:p>
         </p:txBody>
       </p:sp>
@@ -4270,15 +4279,22 @@
           <a:p>
             <a:pPr algn="ctr"/>
             <a:r>
-              <a:rPr lang="en-GB" dirty="0"/>
+              <a:rPr lang="en-GB" sz="2000" dirty="0"/>
               <a:t>LC</a:t>
             </a:r>
             <a:br>
-              <a:rPr lang="en-GB" dirty="0"/>
+              <a:rPr lang="en-GB" sz="2000" dirty="0"/>
             </a:br>
             <a:r>
-              <a:rPr lang="en-GB" dirty="0"/>
+              <a:rPr lang="en-GB" sz="2000" dirty="0"/>
               <a:t>filter</a:t>
+            </a:r>
+          </a:p>
+          <a:p>
+            <a:pPr algn="ctr"/>
+            <a:r>
+              <a:rPr lang="en-GB" sz="2000" dirty="0"/>
+              <a:t>(No need for demo)</a:t>
             </a:r>
           </a:p>
         </p:txBody>
@@ -4298,7 +4314,7 @@
         <p:spPr>
           <a:xfrm>
             <a:off x="416200" y="1505985"/>
-            <a:ext cx="8545544" cy="830997"/>
+            <a:ext cx="5513176" cy="1200329"/>
           </a:xfrm>
           <a:prstGeom prst="rect">
             <a:avLst/>
@@ -4327,7 +4343,17 @@
             </a:pPr>
             <a:r>
               <a:rPr lang="en-GB" dirty="0"/>
-              <a:t>Nominal phase RMS current: 10A at +25°C ambient temperature</a:t>
+              <a:t>Nominal phase RMS current: </a:t>
+            </a:r>
+          </a:p>
+          <a:p>
+            <a:pPr marL="952343" lvl="1" indent="-342900">
+              <a:buFont typeface="Arial" panose="020B0604020202020204" pitchFamily="34" charset="0"/>
+              <a:buChar char="•"/>
+            </a:pPr>
+            <a:r>
+              <a:rPr lang="en-GB" dirty="0"/>
+              <a:t>10A at +25°C ambient temperature</a:t>
             </a:r>
           </a:p>
         </p:txBody>
@@ -4347,7 +4373,7 @@
         <p:spPr>
           <a:xfrm>
             <a:off x="368699" y="6002542"/>
-            <a:ext cx="11390534" cy="707886"/>
+            <a:ext cx="11390534" cy="830997"/>
           </a:xfrm>
           <a:prstGeom prst="rect">
             <a:avLst/>
@@ -4362,21 +4388,77 @@
           <a:p>
             <a:r>
               <a:rPr lang="en-GB" sz="2000" dirty="0"/>
-              <a:t>First test run video: </a:t>
-            </a:r>
-            <a:r>
-              <a:rPr lang="en-GB" sz="1000" dirty="0">
+              <a:t>SW repository: </a:t>
+            </a:r>
+            <a:r>
+              <a:rPr lang="en-GB" sz="2000" dirty="0">
                 <a:hlinkClick r:id="rId5"/>
               </a:rPr>
-              <a:t>https://microchiptechnology-my.sharepoint.com/:v:/g/personal/mark_wendler_microchip_com/ETwXsPh3MT9Ou0Anty5UnXcBujyOEAphIVYeLUMNBcvAUg?e=VeVu4F</a:t>
-            </a:r>
-            <a:endParaRPr lang="en-GB" sz="700" dirty="0"/>
-          </a:p>
-          <a:p>
+              <a:t>https://bitbucket.microchip.com/users/m18034/repos/noisegen/browse</a:t>
+            </a:r>
             <a:endParaRPr lang="en-GB" sz="2000" dirty="0"/>
           </a:p>
-        </p:txBody>
-      </p:sp>
+          <a:p>
+            <a:r>
+              <a:rPr lang="en-GB" sz="1400" dirty="0"/>
+              <a:t>Video1: </a:t>
+            </a:r>
+            <a:r>
+              <a:rPr lang="en-GB" sz="1400" dirty="0">
+                <a:hlinkClick r:id="rId6"/>
+              </a:rPr>
+              <a:t>First test run video</a:t>
+            </a:r>
+            <a:r>
+              <a:rPr lang="en-GB" sz="1400" dirty="0"/>
+              <a:t>		</a:t>
+            </a:r>
+          </a:p>
+          <a:p>
+            <a:r>
+              <a:rPr lang="en-GB" sz="1400" dirty="0"/>
+              <a:t>Video2:	</a:t>
+            </a:r>
+            <a:r>
+              <a:rPr lang="en-GB" sz="1400" dirty="0">
+                <a:hlinkClick r:id="rId7"/>
+              </a:rPr>
+              <a:t>With “car” sound</a:t>
+            </a:r>
+            <a:endParaRPr lang="en-GB" sz="1400" dirty="0"/>
+          </a:p>
+        </p:txBody>
+      </p:sp>
+      <p:pic>
+        <p:nvPicPr>
+          <p:cNvPr id="6" name="Picture 5">
+            <a:extLst>
+              <a:ext uri="{FF2B5EF4-FFF2-40B4-BE49-F238E27FC236}">
+                <a16:creationId xmlns:a16="http://schemas.microsoft.com/office/drawing/2014/main" id="{1651736F-8AD1-4052-B631-8C30E0B7B7AF}"/>
+              </a:ext>
+            </a:extLst>
+          </p:cNvPr>
+          <p:cNvPicPr>
+            <a:picLocks noChangeAspect="1"/>
+          </p:cNvPicPr>
+          <p:nvPr/>
+        </p:nvPicPr>
+        <p:blipFill>
+          <a:blip r:embed="rId8"/>
+          <a:stretch>
+            <a:fillRect/>
+          </a:stretch>
+        </p:blipFill>
+        <p:spPr>
+          <a:xfrm>
+            <a:off x="6295304" y="86247"/>
+            <a:ext cx="5757949" cy="2484434"/>
+          </a:xfrm>
+          <a:prstGeom prst="rect">
+            <a:avLst/>
+          </a:prstGeom>
+        </p:spPr>
+      </p:pic>
     </p:spTree>
     <p:extLst>
       <p:ext uri="{BB962C8B-B14F-4D97-AF65-F5344CB8AC3E}">
@@ -4412,7 +4494,7 @@
           <p:cNvPr id="2" name="Title 1">
             <a:extLst>
               <a:ext uri="{FF2B5EF4-FFF2-40B4-BE49-F238E27FC236}">
-                <a16:creationId xmlns:a16="http://schemas.microsoft.com/office/drawing/2014/main" id="{A135A9E2-3C55-4767-961C-47F2BE96C641}"/>
+                <a16:creationId xmlns:a16="http://schemas.microsoft.com/office/drawing/2014/main" id="{2AB387D3-8DF0-4961-984A-A6CD69499ED1}"/>
               </a:ext>
             </a:extLst>
           </p:cNvPr>
@@ -4430,17 +4512,17 @@
           <a:p>
             <a:r>
               <a:rPr lang="en-GB" dirty="0"/>
-              <a:t>Project tasks/ideas</a:t>
-            </a:r>
-          </a:p>
-        </p:txBody>
-      </p:sp>
-      <p:sp>
-        <p:nvSpPr>
-          <p:cNvPr id="3" name="Content Placeholder 2">
-            <a:extLst>
-              <a:ext uri="{FF2B5EF4-FFF2-40B4-BE49-F238E27FC236}">
-                <a16:creationId xmlns:a16="http://schemas.microsoft.com/office/drawing/2014/main" id="{D2B84C1F-0AB6-41DC-B9F1-586C281FA0B9}"/>
+              <a:t>Software (current status)</a:t>
+            </a:r>
+          </a:p>
+        </p:txBody>
+      </p:sp>
+      <p:sp>
+        <p:nvSpPr>
+          <p:cNvPr id="6" name="Content Placeholder 5">
+            <a:extLst>
+              <a:ext uri="{FF2B5EF4-FFF2-40B4-BE49-F238E27FC236}">
+                <a16:creationId xmlns:a16="http://schemas.microsoft.com/office/drawing/2014/main" id="{6208E353-987D-4EA4-A24B-3AE32C870F2F}"/>
               </a:ext>
             </a:extLst>
           </p:cNvPr>
@@ -4451,115 +4533,552 @@
             <p:ph sz="quarter" idx="13"/>
           </p:nvPr>
         </p:nvSpPr>
-        <p:spPr/>
-        <p:txBody>
-          <a:bodyPr>
-            <a:normAutofit fontScale="92500" lnSpcReduction="20000"/>
+        <p:spPr>
+          <a:xfrm>
+            <a:off x="354870" y="923075"/>
+            <a:ext cx="11403630" cy="3948184"/>
+          </a:xfrm>
+        </p:spPr>
+        <p:txBody>
+          <a:bodyPr/>
+          <a:lstStyle/>
+          <a:p>
+            <a:r>
+              <a:rPr lang="en-GB" dirty="0"/>
+              <a:t>2 mode implemented with </a:t>
+            </a:r>
+            <a:r>
+              <a:rPr lang="en-GB" dirty="0" err="1"/>
+              <a:t>Scilab</a:t>
+            </a:r>
+            <a:r>
+              <a:rPr lang="en-GB" dirty="0"/>
+              <a:t> model:</a:t>
+            </a:r>
+          </a:p>
+          <a:p>
+            <a:pPr lvl="1"/>
+            <a:r>
+              <a:rPr lang="en-GB" dirty="0"/>
+              <a:t>Simple sine wave generator with auto sweeping</a:t>
+            </a:r>
+          </a:p>
+          <a:p>
+            <a:pPr lvl="1"/>
+            <a:r>
+              <a:rPr lang="en-GB" dirty="0"/>
+              <a:t>Sound generator from lookup table (MCU </a:t>
+            </a:r>
+            <a:r>
+              <a:rPr lang="en-GB" dirty="0" err="1"/>
+              <a:t>builtin</a:t>
+            </a:r>
+            <a:r>
+              <a:rPr lang="en-GB" dirty="0"/>
+              <a:t> flash 4k samples limit)</a:t>
+            </a:r>
+          </a:p>
+          <a:p>
+            <a:pPr lvl="1"/>
+            <a:r>
+              <a:rPr lang="en-GB" i="1" dirty="0"/>
+              <a:t>Optional current control mode (Further tuning/investigation needed)</a:t>
+            </a:r>
+          </a:p>
+          <a:p>
+            <a:r>
+              <a:rPr lang="en-GB" dirty="0"/>
+              <a:t>Quick start:</a:t>
+            </a:r>
+          </a:p>
+          <a:p>
+            <a:pPr lvl="1"/>
+            <a:r>
+              <a:rPr lang="en-GB" dirty="0"/>
+              <a:t>SW3 starts PWM output</a:t>
+            </a:r>
+          </a:p>
+          <a:p>
+            <a:pPr lvl="1"/>
+            <a:r>
+              <a:rPr lang="en-GB" dirty="0"/>
+              <a:t>SW1 switches between sine wave and sound gen mode</a:t>
+            </a:r>
+          </a:p>
+          <a:p>
+            <a:pPr lvl="1"/>
+            <a:r>
+              <a:rPr lang="en-GB" dirty="0"/>
+              <a:t>POT changes the  playback frequency or sweeping frequency</a:t>
+            </a:r>
+          </a:p>
+        </p:txBody>
+      </p:sp>
+      <p:sp>
+        <p:nvSpPr>
+          <p:cNvPr id="7" name="TextBox 6">
+            <a:extLst>
+              <a:ext uri="{FF2B5EF4-FFF2-40B4-BE49-F238E27FC236}">
+                <a16:creationId xmlns:a16="http://schemas.microsoft.com/office/drawing/2014/main" id="{58220907-51A3-4F1B-9048-1745AB005FFD}"/>
+              </a:ext>
+            </a:extLst>
+          </p:cNvPr>
+          <p:cNvSpPr txBox="1"/>
+          <p:nvPr/>
+        </p:nvSpPr>
+        <p:spPr>
+          <a:xfrm>
+            <a:off x="6374476" y="5353410"/>
+            <a:ext cx="1537854" cy="830997"/>
+          </a:xfrm>
+          <a:prstGeom prst="rect">
+            <a:avLst/>
+          </a:prstGeom>
+        </p:spPr>
+        <p:style>
+          <a:lnRef idx="2">
+            <a:schemeClr val="accent4"/>
+          </a:lnRef>
+          <a:fillRef idx="1">
+            <a:schemeClr val="lt1"/>
+          </a:fillRef>
+          <a:effectRef idx="0">
+            <a:schemeClr val="accent4"/>
+          </a:effectRef>
+          <a:fontRef idx="minor">
+            <a:schemeClr val="dk1"/>
+          </a:fontRef>
+        </p:style>
+        <p:txBody>
+          <a:bodyPr wrap="square" rtlCol="0">
+            <a:spAutoFit/>
           </a:bodyPr>
           <a:lstStyle/>
           <a:p>
             <a:r>
-              <a:rPr lang="en-GB" dirty="0">
+              <a:rPr lang="en-GB" dirty="0"/>
+              <a:t>X2C model</a:t>
+            </a:r>
+          </a:p>
+          <a:p>
+            <a:r>
+              <a:rPr lang="en-GB" dirty="0"/>
+              <a:t>(20kHz)</a:t>
+            </a:r>
+          </a:p>
+        </p:txBody>
+      </p:sp>
+      <p:sp>
+        <p:nvSpPr>
+          <p:cNvPr id="8" name="TextBox 7">
+            <a:extLst>
+              <a:ext uri="{FF2B5EF4-FFF2-40B4-BE49-F238E27FC236}">
+                <a16:creationId xmlns:a16="http://schemas.microsoft.com/office/drawing/2014/main" id="{2474C2DD-6F92-44FC-A4B5-9C7C9006ED62}"/>
+              </a:ext>
+            </a:extLst>
+          </p:cNvPr>
+          <p:cNvSpPr txBox="1"/>
+          <p:nvPr/>
+        </p:nvSpPr>
+        <p:spPr>
+          <a:xfrm>
+            <a:off x="8798499" y="5351848"/>
+            <a:ext cx="1537854" cy="1200329"/>
+          </a:xfrm>
+          <a:prstGeom prst="rect">
+            <a:avLst/>
+          </a:prstGeom>
+        </p:spPr>
+        <p:style>
+          <a:lnRef idx="2">
+            <a:schemeClr val="accent4"/>
+          </a:lnRef>
+          <a:fillRef idx="1">
+            <a:schemeClr val="lt1"/>
+          </a:fillRef>
+          <a:effectRef idx="0">
+            <a:schemeClr val="accent4"/>
+          </a:effectRef>
+          <a:fontRef idx="minor">
+            <a:schemeClr val="dk1"/>
+          </a:fontRef>
+        </p:style>
+        <p:txBody>
+          <a:bodyPr wrap="square" rtlCol="0">
+            <a:spAutoFit/>
+          </a:bodyPr>
+          <a:lstStyle/>
+          <a:p>
+            <a:r>
+              <a:rPr lang="en-GB" dirty="0"/>
+              <a:t>PWM control</a:t>
+            </a:r>
+          </a:p>
+          <a:p>
+            <a:r>
+              <a:rPr lang="en-GB" dirty="0"/>
+              <a:t>(100kHz)</a:t>
+            </a:r>
+          </a:p>
+        </p:txBody>
+      </p:sp>
+      <p:sp>
+        <p:nvSpPr>
+          <p:cNvPr id="9" name="TextBox 8">
+            <a:extLst>
+              <a:ext uri="{FF2B5EF4-FFF2-40B4-BE49-F238E27FC236}">
+                <a16:creationId xmlns:a16="http://schemas.microsoft.com/office/drawing/2014/main" id="{06BC4302-7EB5-449A-9776-CE33B880EA9E}"/>
+              </a:ext>
+            </a:extLst>
+          </p:cNvPr>
+          <p:cNvSpPr txBox="1"/>
+          <p:nvPr/>
+        </p:nvSpPr>
+        <p:spPr>
+          <a:xfrm>
+            <a:off x="3457900" y="4969615"/>
+            <a:ext cx="2195422" cy="830997"/>
+          </a:xfrm>
+          <a:prstGeom prst="rect">
+            <a:avLst/>
+          </a:prstGeom>
+        </p:spPr>
+        <p:style>
+          <a:lnRef idx="2">
+            <a:schemeClr val="accent4"/>
+          </a:lnRef>
+          <a:fillRef idx="1">
+            <a:schemeClr val="lt1"/>
+          </a:fillRef>
+          <a:effectRef idx="0">
+            <a:schemeClr val="accent4"/>
+          </a:effectRef>
+          <a:fontRef idx="minor">
+            <a:schemeClr val="dk1"/>
+          </a:fontRef>
+        </p:style>
+        <p:txBody>
+          <a:bodyPr wrap="square" rtlCol="0">
+            <a:spAutoFit/>
+          </a:bodyPr>
+          <a:lstStyle/>
+          <a:p>
+            <a:r>
+              <a:rPr lang="en-GB" dirty="0"/>
+              <a:t>Wav 4k sample lookup table</a:t>
+            </a:r>
+          </a:p>
+        </p:txBody>
+      </p:sp>
+      <p:cxnSp>
+        <p:nvCxnSpPr>
+          <p:cNvPr id="11" name="Connector: Elbow 10">
+            <a:extLst>
+              <a:ext uri="{FF2B5EF4-FFF2-40B4-BE49-F238E27FC236}">
+                <a16:creationId xmlns:a16="http://schemas.microsoft.com/office/drawing/2014/main" id="{4A01E2A2-4860-4D55-8548-EC8989FF4C64}"/>
+              </a:ext>
+            </a:extLst>
+          </p:cNvPr>
+          <p:cNvCxnSpPr>
+            <a:stCxn id="9" idx="3"/>
+            <a:endCxn id="7" idx="1"/>
+          </p:cNvCxnSpPr>
+          <p:nvPr/>
+        </p:nvCxnSpPr>
+        <p:spPr>
+          <a:xfrm>
+            <a:off x="5653322" y="5385114"/>
+            <a:ext cx="721154" cy="383795"/>
+          </a:xfrm>
+          <a:prstGeom prst="bentConnector3">
+            <a:avLst/>
+          </a:prstGeom>
+          <a:ln>
+            <a:tailEnd type="triangle"/>
+          </a:ln>
+        </p:spPr>
+        <p:style>
+          <a:lnRef idx="3">
+            <a:schemeClr val="accent4"/>
+          </a:lnRef>
+          <a:fillRef idx="0">
+            <a:schemeClr val="accent4"/>
+          </a:fillRef>
+          <a:effectRef idx="2">
+            <a:schemeClr val="accent4"/>
+          </a:effectRef>
+          <a:fontRef idx="minor">
+            <a:schemeClr val="tx1"/>
+          </a:fontRef>
+        </p:style>
+      </p:cxnSp>
+      <p:pic>
+        <p:nvPicPr>
+          <p:cNvPr id="1026" name="Picture 2" descr="MPLAB® Code Configurator | Microchip Technology">
+            <a:extLst>
+              <a:ext uri="{FF2B5EF4-FFF2-40B4-BE49-F238E27FC236}">
+                <a16:creationId xmlns:a16="http://schemas.microsoft.com/office/drawing/2014/main" id="{319E8A14-EA40-484B-8525-685B6D57BB75}"/>
+              </a:ext>
+            </a:extLst>
+          </p:cNvPr>
+          <p:cNvPicPr>
+            <a:picLocks noChangeAspect="1" noChangeArrowheads="1"/>
+          </p:cNvPicPr>
+          <p:nvPr/>
+        </p:nvPicPr>
+        <p:blipFill>
+          <a:blip r:embed="rId2">
+            <a:extLst>
+              <a:ext uri="{28A0092B-C50C-407E-A947-70E740481C1C}">
+                <a14:useLocalDpi xmlns:a14="http://schemas.microsoft.com/office/drawing/2010/main" val="0"/>
+              </a:ext>
+            </a:extLst>
+          </a:blip>
+          <a:srcRect/>
+          <a:stretch>
+            <a:fillRect/>
+          </a:stretch>
+        </p:blipFill>
+        <p:spPr bwMode="auto">
+          <a:xfrm>
+            <a:off x="217254" y="4969615"/>
+            <a:ext cx="1920046" cy="1317818"/>
+          </a:xfrm>
+          <a:prstGeom prst="rect">
+            <a:avLst/>
+          </a:prstGeom>
+          <a:noFill/>
+          <a:extLst>
+            <a:ext uri="{909E8E84-426E-40DD-AFC4-6F175D3DCCD1}">
+              <a14:hiddenFill xmlns:a14="http://schemas.microsoft.com/office/drawing/2010/main">
                 <a:solidFill>
-                  <a:schemeClr val="accent4"/>
+                  <a:srgbClr val="FFFFFF"/>
                 </a:solidFill>
-              </a:rPr>
-              <a:t>Set-up HW</a:t>
-            </a:r>
-          </a:p>
-          <a:p>
-            <a:r>
-              <a:rPr lang="en-GB" dirty="0">
-                <a:solidFill>
-                  <a:schemeClr val="accent4"/>
-                </a:solidFill>
-              </a:rPr>
-              <a:t>Set-up SW frame (X2C model?)</a:t>
-            </a:r>
-          </a:p>
-          <a:p>
-            <a:r>
-              <a:rPr lang="en-GB" dirty="0">
-                <a:solidFill>
-                  <a:schemeClr val="accent4"/>
-                </a:solidFill>
-              </a:rPr>
-              <a:t>Create single frequency noise (feed forward Sinus voltage output based on POT value)</a:t>
-            </a:r>
-          </a:p>
+              </a14:hiddenFill>
+            </a:ext>
+          </a:extLst>
+        </p:spPr>
+      </p:pic>
+      <p:cxnSp>
+        <p:nvCxnSpPr>
+          <p:cNvPr id="15" name="Connector: Elbow 14">
+            <a:extLst>
+              <a:ext uri="{FF2B5EF4-FFF2-40B4-BE49-F238E27FC236}">
+                <a16:creationId xmlns:a16="http://schemas.microsoft.com/office/drawing/2014/main" id="{839790D8-DEBF-42AC-9A57-FCBD1EB39693}"/>
+              </a:ext>
+            </a:extLst>
+          </p:cNvPr>
+          <p:cNvCxnSpPr>
+            <a:cxnSpLocks/>
+            <a:stCxn id="7" idx="3"/>
+            <a:endCxn id="8" idx="1"/>
+          </p:cNvCxnSpPr>
+          <p:nvPr/>
+        </p:nvCxnSpPr>
+        <p:spPr>
+          <a:xfrm>
+            <a:off x="7912330" y="5768909"/>
+            <a:ext cx="886169" cy="183104"/>
+          </a:xfrm>
+          <a:prstGeom prst="bentConnector3">
+            <a:avLst/>
+          </a:prstGeom>
+          <a:ln>
+            <a:tailEnd type="triangle"/>
+          </a:ln>
+          <a:effectLst/>
+        </p:spPr>
+        <p:style>
+          <a:lnRef idx="2">
+            <a:schemeClr val="accent1"/>
+          </a:lnRef>
+          <a:fillRef idx="0">
+            <a:schemeClr val="accent1"/>
+          </a:fillRef>
+          <a:effectRef idx="1">
+            <a:schemeClr val="accent1"/>
+          </a:effectRef>
+          <a:fontRef idx="minor">
+            <a:schemeClr val="tx1"/>
+          </a:fontRef>
+        </p:style>
+      </p:cxnSp>
+      <p:sp>
+        <p:nvSpPr>
+          <p:cNvPr id="22" name="TextBox 21">
+            <a:extLst>
+              <a:ext uri="{FF2B5EF4-FFF2-40B4-BE49-F238E27FC236}">
+                <a16:creationId xmlns:a16="http://schemas.microsoft.com/office/drawing/2014/main" id="{097ADB6E-27B8-423A-ABAA-05D7CA054EBF}"/>
+              </a:ext>
+            </a:extLst>
+          </p:cNvPr>
+          <p:cNvSpPr txBox="1"/>
+          <p:nvPr/>
+        </p:nvSpPr>
+        <p:spPr>
+          <a:xfrm>
+            <a:off x="3457901" y="6027003"/>
+            <a:ext cx="2195422" cy="830997"/>
+          </a:xfrm>
+          <a:prstGeom prst="rect">
+            <a:avLst/>
+          </a:prstGeom>
+        </p:spPr>
+        <p:style>
+          <a:lnRef idx="2">
+            <a:schemeClr val="accent4"/>
+          </a:lnRef>
+          <a:fillRef idx="1">
+            <a:schemeClr val="lt1"/>
+          </a:fillRef>
+          <a:effectRef idx="0">
+            <a:schemeClr val="accent4"/>
+          </a:effectRef>
+          <a:fontRef idx="minor">
+            <a:schemeClr val="dk1"/>
+          </a:fontRef>
+        </p:style>
+        <p:txBody>
+          <a:bodyPr wrap="square" rtlCol="0">
+            <a:spAutoFit/>
+          </a:bodyPr>
+          <a:lstStyle/>
           <a:p>
             <a:r>
               <a:rPr lang="en-GB" dirty="0"/>
-              <a:t>Verify needed LC filters</a:t>
-            </a:r>
-          </a:p>
-          <a:p>
-            <a:r>
-              <a:rPr lang="en-GB" dirty="0"/>
-              <a:t>Investigate current control feature</a:t>
-            </a:r>
-          </a:p>
-          <a:p>
-            <a:r>
-              <a:rPr lang="en-GB" dirty="0"/>
-              <a:t>Implement flash reading (click board)</a:t>
-            </a:r>
-          </a:p>
-          <a:p>
-            <a:r>
-              <a:rPr lang="en-GB" dirty="0"/>
-              <a:t>Investigate </a:t>
-            </a:r>
-            <a:r>
-              <a:rPr lang="en-GB" dirty="0">
-                <a:hlinkClick r:id="rId2"/>
-              </a:rPr>
-              <a:t>G.726A Decoder</a:t>
-            </a:r>
-            <a:r>
-              <a:rPr lang="en-GB" dirty="0"/>
-              <a:t> (G.711? Or WAV) can do the job or not</a:t>
-            </a:r>
-          </a:p>
-          <a:p>
-            <a:r>
-              <a:rPr lang="en-GB" dirty="0"/>
-              <a:t>Implement selected Audio decoder</a:t>
-            </a:r>
-          </a:p>
-          <a:p>
-            <a:r>
-              <a:rPr lang="en-GB" dirty="0"/>
-              <a:t>Investigate audio effect features (filters)</a:t>
-            </a:r>
-          </a:p>
-          <a:p>
-            <a:r>
-              <a:rPr lang="en-GB" dirty="0"/>
-              <a:t>Further optimisation for external noise immunity (LVMC capable)</a:t>
-            </a:r>
-          </a:p>
-          <a:p>
-            <a:r>
-              <a:rPr lang="en-GB" dirty="0"/>
-              <a:t>and EMC</a:t>
-            </a:r>
-          </a:p>
-          <a:p>
-            <a:r>
-              <a:rPr lang="en-GB" dirty="0"/>
-              <a:t>Custom board, etc…</a:t>
-            </a:r>
-          </a:p>
-          <a:p>
-            <a:endParaRPr lang="en-GB" dirty="0"/>
+              <a:t>POT and buttons</a:t>
+            </a:r>
+          </a:p>
+        </p:txBody>
+      </p:sp>
+      <p:cxnSp>
+        <p:nvCxnSpPr>
+          <p:cNvPr id="24" name="Connector: Elbow 23">
+            <a:extLst>
+              <a:ext uri="{FF2B5EF4-FFF2-40B4-BE49-F238E27FC236}">
+                <a16:creationId xmlns:a16="http://schemas.microsoft.com/office/drawing/2014/main" id="{2AB19369-2F6B-45D3-AE62-3E051B61C531}"/>
+              </a:ext>
+            </a:extLst>
+          </p:cNvPr>
+          <p:cNvCxnSpPr>
+            <a:cxnSpLocks/>
+            <a:stCxn id="22" idx="3"/>
+            <a:endCxn id="7" idx="1"/>
+          </p:cNvCxnSpPr>
+          <p:nvPr/>
+        </p:nvCxnSpPr>
+        <p:spPr>
+          <a:xfrm flipV="1">
+            <a:off x="5653323" y="5768909"/>
+            <a:ext cx="721153" cy="673593"/>
+          </a:xfrm>
+          <a:prstGeom prst="bentConnector3">
+            <a:avLst/>
+          </a:prstGeom>
+          <a:ln>
+            <a:tailEnd type="triangle"/>
+          </a:ln>
+        </p:spPr>
+        <p:style>
+          <a:lnRef idx="3">
+            <a:schemeClr val="accent4"/>
+          </a:lnRef>
+          <a:fillRef idx="0">
+            <a:schemeClr val="accent4"/>
+          </a:fillRef>
+          <a:effectRef idx="2">
+            <a:schemeClr val="accent4"/>
+          </a:effectRef>
+          <a:fontRef idx="minor">
+            <a:schemeClr val="tx1"/>
+          </a:fontRef>
+        </p:style>
+      </p:cxnSp>
+      <p:cxnSp>
+        <p:nvCxnSpPr>
+          <p:cNvPr id="27" name="Connector: Elbow 26">
+            <a:extLst>
+              <a:ext uri="{FF2B5EF4-FFF2-40B4-BE49-F238E27FC236}">
+                <a16:creationId xmlns:a16="http://schemas.microsoft.com/office/drawing/2014/main" id="{5B27F21B-F160-4B80-A980-5B66FB0C6EBC}"/>
+              </a:ext>
+            </a:extLst>
+          </p:cNvPr>
+          <p:cNvCxnSpPr>
+            <a:cxnSpLocks/>
+            <a:stCxn id="7" idx="3"/>
+            <a:endCxn id="8" idx="1"/>
+          </p:cNvCxnSpPr>
+          <p:nvPr/>
+        </p:nvCxnSpPr>
+        <p:spPr>
+          <a:xfrm>
+            <a:off x="7912330" y="5768909"/>
+            <a:ext cx="886169" cy="183104"/>
+          </a:xfrm>
+          <a:prstGeom prst="bentConnector3">
+            <a:avLst>
+              <a:gd name="adj1" fmla="val 50000"/>
+            </a:avLst>
+          </a:prstGeom>
+          <a:ln>
+            <a:tailEnd type="triangle"/>
+          </a:ln>
+        </p:spPr>
+        <p:style>
+          <a:lnRef idx="3">
+            <a:schemeClr val="accent4"/>
+          </a:lnRef>
+          <a:fillRef idx="0">
+            <a:schemeClr val="accent4"/>
+          </a:fillRef>
+          <a:effectRef idx="2">
+            <a:schemeClr val="accent4"/>
+          </a:effectRef>
+          <a:fontRef idx="minor">
+            <a:schemeClr val="tx1"/>
+          </a:fontRef>
+        </p:style>
+      </p:cxnSp>
+      <p:sp>
+        <p:nvSpPr>
+          <p:cNvPr id="29" name="TextBox 28">
+            <a:extLst>
+              <a:ext uri="{FF2B5EF4-FFF2-40B4-BE49-F238E27FC236}">
+                <a16:creationId xmlns:a16="http://schemas.microsoft.com/office/drawing/2014/main" id="{0BF65379-ECDF-463E-82B5-12BB534326BD}"/>
+              </a:ext>
+            </a:extLst>
+          </p:cNvPr>
+          <p:cNvSpPr txBox="1"/>
+          <p:nvPr/>
+        </p:nvSpPr>
+        <p:spPr>
+          <a:xfrm>
+            <a:off x="82864" y="6206367"/>
+            <a:ext cx="2336139" cy="646331"/>
+          </a:xfrm>
+          <a:prstGeom prst="rect">
+            <a:avLst/>
+          </a:prstGeom>
+          <a:noFill/>
+        </p:spPr>
+        <p:txBody>
+          <a:bodyPr wrap="square" rtlCol="0">
+            <a:spAutoFit/>
+          </a:bodyPr>
+          <a:lstStyle/>
+          <a:p>
+            <a:pPr algn="ctr"/>
+            <a:r>
+              <a:rPr lang="en-GB" sz="1800" dirty="0"/>
+              <a:t>HW initialization and peripheral APIs</a:t>
+            </a:r>
           </a:p>
         </p:txBody>
       </p:sp>
     </p:spTree>
     <p:extLst>
       <p:ext uri="{BB962C8B-B14F-4D97-AF65-F5344CB8AC3E}">
-        <p14:creationId xmlns:p14="http://schemas.microsoft.com/office/powerpoint/2010/main" val="715928076"/>
+        <p14:creationId xmlns:p14="http://schemas.microsoft.com/office/powerpoint/2010/main" val="847821009"/>
       </p:ext>
     </p:extLst>
   </p:cSld>
@@ -4586,6 +5105,1233 @@
           <a:chExt cx="0" cy="0"/>
         </a:xfrm>
       </p:grpSpPr>
+      <p:pic>
+        <p:nvPicPr>
+          <p:cNvPr id="16" name="Picture 15">
+            <a:extLst>
+              <a:ext uri="{FF2B5EF4-FFF2-40B4-BE49-F238E27FC236}">
+                <a16:creationId xmlns:a16="http://schemas.microsoft.com/office/drawing/2014/main" id="{7B8769D4-BE72-4A5E-9A18-80E503915879}"/>
+              </a:ext>
+            </a:extLst>
+          </p:cNvPr>
+          <p:cNvPicPr>
+            <a:picLocks noChangeAspect="1"/>
+          </p:cNvPicPr>
+          <p:nvPr/>
+        </p:nvPicPr>
+        <p:blipFill>
+          <a:blip r:embed="rId2"/>
+          <a:stretch>
+            <a:fillRect/>
+          </a:stretch>
+        </p:blipFill>
+        <p:spPr>
+          <a:xfrm>
+            <a:off x="184872" y="1571412"/>
+            <a:ext cx="8834438" cy="4820767"/>
+          </a:xfrm>
+          <a:prstGeom prst="rect">
+            <a:avLst/>
+          </a:prstGeom>
+        </p:spPr>
+      </p:pic>
+      <p:sp>
+        <p:nvSpPr>
+          <p:cNvPr id="2" name="Title 1">
+            <a:extLst>
+              <a:ext uri="{FF2B5EF4-FFF2-40B4-BE49-F238E27FC236}">
+                <a16:creationId xmlns:a16="http://schemas.microsoft.com/office/drawing/2014/main" id="{8EA118CA-FAB2-42A5-9F8B-E9A89C4547EA}"/>
+              </a:ext>
+            </a:extLst>
+          </p:cNvPr>
+          <p:cNvSpPr>
+            <a:spLocks noGrp="1"/>
+          </p:cNvSpPr>
+          <p:nvPr>
+            <p:ph type="title"/>
+          </p:nvPr>
+        </p:nvSpPr>
+        <p:spPr/>
+        <p:txBody>
+          <a:bodyPr/>
+          <a:lstStyle/>
+          <a:p>
+            <a:r>
+              <a:rPr lang="en-GB" dirty="0"/>
+              <a:t>Model</a:t>
+            </a:r>
+          </a:p>
+        </p:txBody>
+      </p:sp>
+      <p:sp>
+        <p:nvSpPr>
+          <p:cNvPr id="8" name="Rectangle 7">
+            <a:extLst>
+              <a:ext uri="{FF2B5EF4-FFF2-40B4-BE49-F238E27FC236}">
+                <a16:creationId xmlns:a16="http://schemas.microsoft.com/office/drawing/2014/main" id="{7BF1F5F3-5A1D-498C-A7CF-DA035724F216}"/>
+              </a:ext>
+            </a:extLst>
+          </p:cNvPr>
+          <p:cNvSpPr/>
+          <p:nvPr/>
+        </p:nvSpPr>
+        <p:spPr>
+          <a:xfrm>
+            <a:off x="282633" y="2394065"/>
+            <a:ext cx="5020887" cy="1587731"/>
+          </a:xfrm>
+          <a:prstGeom prst="rect">
+            <a:avLst/>
+          </a:prstGeom>
+          <a:noFill/>
+          <a:ln>
+            <a:solidFill>
+              <a:schemeClr val="tx1"/>
+            </a:solidFill>
+          </a:ln>
+        </p:spPr>
+        <p:style>
+          <a:lnRef idx="2">
+            <a:schemeClr val="dk1"/>
+          </a:lnRef>
+          <a:fillRef idx="1">
+            <a:schemeClr val="lt1"/>
+          </a:fillRef>
+          <a:effectRef idx="0">
+            <a:schemeClr val="dk1"/>
+          </a:effectRef>
+          <a:fontRef idx="minor">
+            <a:schemeClr val="dk1"/>
+          </a:fontRef>
+        </p:style>
+        <p:txBody>
+          <a:bodyPr rot="0" spcFirstLastPara="0" vertOverflow="overflow" horzOverflow="overflow" vert="horz" wrap="square" lIns="91440" tIns="45720" rIns="91440" bIns="45720" numCol="1" spcCol="0" rtlCol="0" fromWordArt="0" anchor="ctr" anchorCtr="0" forceAA="0" compatLnSpc="1">
+            <a:prstTxWarp prst="textNoShape">
+              <a:avLst/>
+            </a:prstTxWarp>
+            <a:noAutofit/>
+          </a:bodyPr>
+          <a:lstStyle/>
+          <a:p>
+            <a:pPr algn="ctr"/>
+            <a:endParaRPr lang="en-GB"/>
+          </a:p>
+        </p:txBody>
+      </p:sp>
+      <p:sp>
+        <p:nvSpPr>
+          <p:cNvPr id="9" name="TextBox 8">
+            <a:extLst>
+              <a:ext uri="{FF2B5EF4-FFF2-40B4-BE49-F238E27FC236}">
+                <a16:creationId xmlns:a16="http://schemas.microsoft.com/office/drawing/2014/main" id="{DBE9573C-3C5A-4686-94F9-DAFCA39B5D07}"/>
+              </a:ext>
+            </a:extLst>
+          </p:cNvPr>
+          <p:cNvSpPr txBox="1"/>
+          <p:nvPr/>
+        </p:nvSpPr>
+        <p:spPr>
+          <a:xfrm>
+            <a:off x="4511039" y="1785722"/>
+            <a:ext cx="2130830" cy="461665"/>
+          </a:xfrm>
+          <a:prstGeom prst="rect">
+            <a:avLst/>
+          </a:prstGeom>
+          <a:noFill/>
+        </p:spPr>
+        <p:txBody>
+          <a:bodyPr wrap="square" rtlCol="0">
+            <a:spAutoFit/>
+          </a:bodyPr>
+          <a:lstStyle/>
+          <a:p>
+            <a:r>
+              <a:rPr lang="en-GB" dirty="0"/>
+              <a:t>Sine generator</a:t>
+            </a:r>
+          </a:p>
+        </p:txBody>
+      </p:sp>
+      <p:sp>
+        <p:nvSpPr>
+          <p:cNvPr id="11" name="Rectangle 10">
+            <a:extLst>
+              <a:ext uri="{FF2B5EF4-FFF2-40B4-BE49-F238E27FC236}">
+                <a16:creationId xmlns:a16="http://schemas.microsoft.com/office/drawing/2014/main" id="{38AEEA60-A59C-489D-B4F9-7E8638B0CA95}"/>
+              </a:ext>
+            </a:extLst>
+          </p:cNvPr>
+          <p:cNvSpPr/>
+          <p:nvPr/>
+        </p:nvSpPr>
+        <p:spPr>
+          <a:xfrm>
+            <a:off x="1346662" y="4962698"/>
+            <a:ext cx="3549534" cy="1556111"/>
+          </a:xfrm>
+          <a:prstGeom prst="rect">
+            <a:avLst/>
+          </a:prstGeom>
+          <a:noFill/>
+          <a:ln/>
+        </p:spPr>
+        <p:style>
+          <a:lnRef idx="2">
+            <a:schemeClr val="accent2"/>
+          </a:lnRef>
+          <a:fillRef idx="1">
+            <a:schemeClr val="lt1"/>
+          </a:fillRef>
+          <a:effectRef idx="0">
+            <a:schemeClr val="accent2"/>
+          </a:effectRef>
+          <a:fontRef idx="minor">
+            <a:schemeClr val="dk1"/>
+          </a:fontRef>
+        </p:style>
+        <p:txBody>
+          <a:bodyPr rot="0" spcFirstLastPara="0" vertOverflow="overflow" horzOverflow="overflow" vert="horz" wrap="square" lIns="91440" tIns="45720" rIns="91440" bIns="45720" numCol="1" spcCol="0" rtlCol="0" fromWordArt="0" anchor="ctr" anchorCtr="0" forceAA="0" compatLnSpc="1">
+            <a:prstTxWarp prst="textNoShape">
+              <a:avLst/>
+            </a:prstTxWarp>
+            <a:noAutofit/>
+          </a:bodyPr>
+          <a:lstStyle/>
+          <a:p>
+            <a:pPr algn="ctr"/>
+            <a:endParaRPr lang="en-GB"/>
+          </a:p>
+        </p:txBody>
+      </p:sp>
+      <p:sp>
+        <p:nvSpPr>
+          <p:cNvPr id="12" name="TextBox 11">
+            <a:extLst>
+              <a:ext uri="{FF2B5EF4-FFF2-40B4-BE49-F238E27FC236}">
+                <a16:creationId xmlns:a16="http://schemas.microsoft.com/office/drawing/2014/main" id="{0AEA6A07-5314-4B03-B811-89C1319F301B}"/>
+              </a:ext>
+            </a:extLst>
+          </p:cNvPr>
+          <p:cNvSpPr txBox="1"/>
+          <p:nvPr/>
+        </p:nvSpPr>
+        <p:spPr>
+          <a:xfrm>
+            <a:off x="1443141" y="6100880"/>
+            <a:ext cx="3513398" cy="461665"/>
+          </a:xfrm>
+          <a:prstGeom prst="rect">
+            <a:avLst/>
+          </a:prstGeom>
+          <a:noFill/>
+        </p:spPr>
+        <p:txBody>
+          <a:bodyPr wrap="none" rtlCol="0">
+            <a:spAutoFit/>
+          </a:bodyPr>
+          <a:lstStyle/>
+          <a:p>
+            <a:r>
+              <a:rPr lang="en-GB" dirty="0">
+                <a:solidFill>
+                  <a:schemeClr val="accent2"/>
+                </a:solidFill>
+              </a:rPr>
+              <a:t>Lookup table for car sound</a:t>
+            </a:r>
+          </a:p>
+        </p:txBody>
+      </p:sp>
+      <p:sp>
+        <p:nvSpPr>
+          <p:cNvPr id="13" name="Rectangle 12">
+            <a:extLst>
+              <a:ext uri="{FF2B5EF4-FFF2-40B4-BE49-F238E27FC236}">
+                <a16:creationId xmlns:a16="http://schemas.microsoft.com/office/drawing/2014/main" id="{3A53B65F-B85B-4EEC-A88B-DD613AA3F886}"/>
+              </a:ext>
+            </a:extLst>
+          </p:cNvPr>
+          <p:cNvSpPr/>
+          <p:nvPr/>
+        </p:nvSpPr>
+        <p:spPr>
+          <a:xfrm>
+            <a:off x="5381107" y="3022883"/>
+            <a:ext cx="1892530" cy="958913"/>
+          </a:xfrm>
+          <a:prstGeom prst="rect">
+            <a:avLst/>
+          </a:prstGeom>
+          <a:noFill/>
+          <a:ln/>
+        </p:spPr>
+        <p:style>
+          <a:lnRef idx="2">
+            <a:schemeClr val="accent5"/>
+          </a:lnRef>
+          <a:fillRef idx="1">
+            <a:schemeClr val="lt1"/>
+          </a:fillRef>
+          <a:effectRef idx="0">
+            <a:schemeClr val="accent5"/>
+          </a:effectRef>
+          <a:fontRef idx="minor">
+            <a:schemeClr val="dk1"/>
+          </a:fontRef>
+        </p:style>
+        <p:txBody>
+          <a:bodyPr rot="0" spcFirstLastPara="0" vertOverflow="overflow" horzOverflow="overflow" vert="horz" wrap="square" lIns="91440" tIns="45720" rIns="91440" bIns="45720" numCol="1" spcCol="0" rtlCol="0" fromWordArt="0" anchor="ctr" anchorCtr="0" forceAA="0" compatLnSpc="1">
+            <a:prstTxWarp prst="textNoShape">
+              <a:avLst/>
+            </a:prstTxWarp>
+            <a:noAutofit/>
+          </a:bodyPr>
+          <a:lstStyle/>
+          <a:p>
+            <a:pPr algn="ctr"/>
+            <a:endParaRPr lang="en-GB"/>
+          </a:p>
+        </p:txBody>
+      </p:sp>
+      <p:sp>
+        <p:nvSpPr>
+          <p:cNvPr id="14" name="TextBox 13">
+            <a:extLst>
+              <a:ext uri="{FF2B5EF4-FFF2-40B4-BE49-F238E27FC236}">
+                <a16:creationId xmlns:a16="http://schemas.microsoft.com/office/drawing/2014/main" id="{3C7781CC-F33F-439C-B8DD-02F9383BB380}"/>
+              </a:ext>
+            </a:extLst>
+          </p:cNvPr>
+          <p:cNvSpPr txBox="1"/>
+          <p:nvPr/>
+        </p:nvSpPr>
+        <p:spPr>
+          <a:xfrm>
+            <a:off x="7273637" y="2798616"/>
+            <a:ext cx="3458094" cy="830997"/>
+          </a:xfrm>
+          <a:prstGeom prst="rect">
+            <a:avLst/>
+          </a:prstGeom>
+          <a:noFill/>
+        </p:spPr>
+        <p:txBody>
+          <a:bodyPr wrap="square" rtlCol="0">
+            <a:spAutoFit/>
+          </a:bodyPr>
+          <a:lstStyle/>
+          <a:p>
+            <a:r>
+              <a:rPr lang="en-GB" dirty="0">
+                <a:solidFill>
+                  <a:schemeClr val="accent5"/>
+                </a:solidFill>
+              </a:rPr>
+              <a:t>Optional current control for experiments</a:t>
+            </a:r>
+          </a:p>
+        </p:txBody>
+      </p:sp>
+      <p:sp>
+        <p:nvSpPr>
+          <p:cNvPr id="17" name="Rectangle 16">
+            <a:extLst>
+              <a:ext uri="{FF2B5EF4-FFF2-40B4-BE49-F238E27FC236}">
+                <a16:creationId xmlns:a16="http://schemas.microsoft.com/office/drawing/2014/main" id="{C82BDBD4-2976-4D45-8828-75D8D03EC110}"/>
+              </a:ext>
+            </a:extLst>
+          </p:cNvPr>
+          <p:cNvSpPr/>
+          <p:nvPr/>
+        </p:nvSpPr>
+        <p:spPr>
+          <a:xfrm>
+            <a:off x="4956539" y="5052333"/>
+            <a:ext cx="1892530" cy="958913"/>
+          </a:xfrm>
+          <a:prstGeom prst="rect">
+            <a:avLst/>
+          </a:prstGeom>
+          <a:noFill/>
+          <a:ln/>
+        </p:spPr>
+        <p:style>
+          <a:lnRef idx="2">
+            <a:schemeClr val="accent4"/>
+          </a:lnRef>
+          <a:fillRef idx="1">
+            <a:schemeClr val="lt1"/>
+          </a:fillRef>
+          <a:effectRef idx="0">
+            <a:schemeClr val="accent4"/>
+          </a:effectRef>
+          <a:fontRef idx="minor">
+            <a:schemeClr val="dk1"/>
+          </a:fontRef>
+        </p:style>
+        <p:txBody>
+          <a:bodyPr rot="0" spcFirstLastPara="0" vertOverflow="overflow" horzOverflow="overflow" vert="horz" wrap="square" lIns="91440" tIns="45720" rIns="91440" bIns="45720" numCol="1" spcCol="0" rtlCol="0" fromWordArt="0" anchor="ctr" anchorCtr="0" forceAA="0" compatLnSpc="1">
+            <a:prstTxWarp prst="textNoShape">
+              <a:avLst/>
+            </a:prstTxWarp>
+            <a:noAutofit/>
+          </a:bodyPr>
+          <a:lstStyle/>
+          <a:p>
+            <a:pPr algn="ctr"/>
+            <a:endParaRPr lang="en-GB"/>
+          </a:p>
+        </p:txBody>
+      </p:sp>
+      <p:sp>
+        <p:nvSpPr>
+          <p:cNvPr id="18" name="TextBox 17">
+            <a:extLst>
+              <a:ext uri="{FF2B5EF4-FFF2-40B4-BE49-F238E27FC236}">
+                <a16:creationId xmlns:a16="http://schemas.microsoft.com/office/drawing/2014/main" id="{EC2B3ACC-54B6-48C9-AD13-67AFD38226B2}"/>
+              </a:ext>
+            </a:extLst>
+          </p:cNvPr>
+          <p:cNvSpPr txBox="1"/>
+          <p:nvPr/>
+        </p:nvSpPr>
+        <p:spPr>
+          <a:xfrm>
+            <a:off x="6909412" y="5180249"/>
+            <a:ext cx="3458094" cy="1200329"/>
+          </a:xfrm>
+          <a:prstGeom prst="rect">
+            <a:avLst/>
+          </a:prstGeom>
+          <a:noFill/>
+          <a:ln>
+            <a:noFill/>
+          </a:ln>
+        </p:spPr>
+        <p:style>
+          <a:lnRef idx="0">
+            <a:scrgbClr r="0" g="0" b="0"/>
+          </a:lnRef>
+          <a:fillRef idx="0">
+            <a:scrgbClr r="0" g="0" b="0"/>
+          </a:fillRef>
+          <a:effectRef idx="0">
+            <a:scrgbClr r="0" g="0" b="0"/>
+          </a:effectRef>
+          <a:fontRef idx="minor">
+            <a:schemeClr val="accent4"/>
+          </a:fontRef>
+        </p:style>
+        <p:txBody>
+          <a:bodyPr wrap="square" rtlCol="0">
+            <a:spAutoFit/>
+          </a:bodyPr>
+          <a:lstStyle/>
+          <a:p>
+            <a:r>
+              <a:rPr lang="en-GB" dirty="0">
+                <a:solidFill>
+                  <a:srgbClr val="00B050"/>
+                </a:solidFill>
+              </a:rPr>
+              <a:t>Low pass</a:t>
+            </a:r>
+          </a:p>
+          <a:p>
+            <a:r>
+              <a:rPr lang="en-GB" dirty="0">
+                <a:solidFill>
+                  <a:srgbClr val="00B050"/>
+                </a:solidFill>
+              </a:rPr>
+              <a:t>High pass</a:t>
+            </a:r>
+          </a:p>
+          <a:p>
+            <a:r>
+              <a:rPr lang="en-GB" dirty="0">
+                <a:solidFill>
+                  <a:srgbClr val="00B050"/>
+                </a:solidFill>
+              </a:rPr>
+              <a:t>Gain control</a:t>
+            </a:r>
+          </a:p>
+        </p:txBody>
+      </p:sp>
+    </p:spTree>
+    <p:extLst>
+      <p:ext uri="{BB962C8B-B14F-4D97-AF65-F5344CB8AC3E}">
+        <p14:creationId xmlns:p14="http://schemas.microsoft.com/office/powerpoint/2010/main" val="581269520"/>
+      </p:ext>
+    </p:extLst>
+  </p:cSld>
+  <p:clrMapOvr>
+    <a:masterClrMapping/>
+  </p:clrMapOvr>
+</p:sld>
+</file>
+
+<file path=ppt/slides/slide5.xml><?xml version="1.0" encoding="utf-8"?>
+<p:sld xmlns:a="http://schemas.openxmlformats.org/drawingml/2006/main" xmlns:r="http://schemas.openxmlformats.org/officeDocument/2006/relationships" xmlns:p="http://schemas.openxmlformats.org/presentationml/2006/main">
+  <p:cSld>
+    <p:spTree>
+      <p:nvGrpSpPr>
+        <p:cNvPr id="1" name=""/>
+        <p:cNvGrpSpPr/>
+        <p:nvPr/>
+      </p:nvGrpSpPr>
+      <p:grpSpPr>
+        <a:xfrm>
+          <a:off x="0" y="0"/>
+          <a:ext cx="0" cy="0"/>
+          <a:chOff x="0" y="0"/>
+          <a:chExt cx="0" cy="0"/>
+        </a:xfrm>
+      </p:grpSpPr>
+      <p:sp>
+        <p:nvSpPr>
+          <p:cNvPr id="2" name="Title 1">
+            <a:extLst>
+              <a:ext uri="{FF2B5EF4-FFF2-40B4-BE49-F238E27FC236}">
+                <a16:creationId xmlns:a16="http://schemas.microsoft.com/office/drawing/2014/main" id="{A135A9E2-3C55-4767-961C-47F2BE96C641}"/>
+              </a:ext>
+            </a:extLst>
+          </p:cNvPr>
+          <p:cNvSpPr>
+            <a:spLocks noGrp="1"/>
+          </p:cNvSpPr>
+          <p:nvPr>
+            <p:ph type="title"/>
+          </p:nvPr>
+        </p:nvSpPr>
+        <p:spPr/>
+        <p:txBody>
+          <a:bodyPr/>
+          <a:lstStyle/>
+          <a:p>
+            <a:r>
+              <a:rPr lang="en-GB" dirty="0"/>
+              <a:t>Project tasks/ideas</a:t>
+            </a:r>
+          </a:p>
+        </p:txBody>
+      </p:sp>
+      <p:sp>
+        <p:nvSpPr>
+          <p:cNvPr id="3" name="Content Placeholder 2">
+            <a:extLst>
+              <a:ext uri="{FF2B5EF4-FFF2-40B4-BE49-F238E27FC236}">
+                <a16:creationId xmlns:a16="http://schemas.microsoft.com/office/drawing/2014/main" id="{D2B84C1F-0AB6-41DC-B9F1-586C281FA0B9}"/>
+              </a:ext>
+            </a:extLst>
+          </p:cNvPr>
+          <p:cNvSpPr>
+            <a:spLocks noGrp="1"/>
+          </p:cNvSpPr>
+          <p:nvPr>
+            <p:ph sz="quarter" idx="13"/>
+          </p:nvPr>
+        </p:nvSpPr>
+        <p:spPr/>
+        <p:txBody>
+          <a:bodyPr>
+            <a:normAutofit fontScale="85000" lnSpcReduction="20000"/>
+          </a:bodyPr>
+          <a:lstStyle/>
+          <a:p>
+            <a:r>
+              <a:rPr lang="en-GB" dirty="0">
+                <a:solidFill>
+                  <a:schemeClr val="accent4"/>
+                </a:solidFill>
+              </a:rPr>
+              <a:t>Set-up HW</a:t>
+            </a:r>
+          </a:p>
+          <a:p>
+            <a:r>
+              <a:rPr lang="en-GB" dirty="0">
+                <a:solidFill>
+                  <a:schemeClr val="accent4"/>
+                </a:solidFill>
+              </a:rPr>
+              <a:t>Set-up SW frame (X2C model?)</a:t>
+            </a:r>
+          </a:p>
+          <a:p>
+            <a:r>
+              <a:rPr lang="en-GB" dirty="0">
+                <a:solidFill>
+                  <a:schemeClr val="accent4"/>
+                </a:solidFill>
+              </a:rPr>
+              <a:t>Create single frequency noise (feed forward Sinus voltage output based on POT value)</a:t>
+            </a:r>
+          </a:p>
+          <a:p>
+            <a:r>
+              <a:rPr lang="en-GB" dirty="0">
+                <a:solidFill>
+                  <a:schemeClr val="accent4"/>
+                </a:solidFill>
+              </a:rPr>
+              <a:t>Playback a short wav file from a lookup table (from MCU flash)</a:t>
+            </a:r>
+          </a:p>
+          <a:p>
+            <a:r>
+              <a:rPr lang="en-GB" dirty="0"/>
+              <a:t>Implement flash reading (click board)</a:t>
+            </a:r>
+          </a:p>
+          <a:p>
+            <a:r>
+              <a:rPr lang="en-GB" dirty="0"/>
+              <a:t>Investigate </a:t>
+            </a:r>
+            <a:r>
+              <a:rPr lang="en-GB" dirty="0">
+                <a:hlinkClick r:id="rId2"/>
+              </a:rPr>
+              <a:t>G.726A Decoder</a:t>
+            </a:r>
+            <a:r>
+              <a:rPr lang="en-GB" dirty="0"/>
+              <a:t> (G.711? Or WAV) can do the job or not</a:t>
+            </a:r>
+          </a:p>
+          <a:p>
+            <a:r>
+              <a:rPr lang="en-GB" dirty="0"/>
+              <a:t>Implement selected Audio decoder</a:t>
+            </a:r>
+          </a:p>
+          <a:p>
+            <a:r>
+              <a:rPr lang="en-GB" dirty="0"/>
+              <a:t>Investigate audio effect features (filters)</a:t>
+            </a:r>
+          </a:p>
+          <a:p>
+            <a:r>
+              <a:rPr lang="en-GB" dirty="0"/>
+              <a:t>Investigate current control feature</a:t>
+            </a:r>
+          </a:p>
+          <a:p>
+            <a:r>
+              <a:rPr lang="en-GB" dirty="0"/>
+              <a:t>Verify needed LC filters (if needed)</a:t>
+            </a:r>
+          </a:p>
+          <a:p>
+            <a:r>
+              <a:rPr lang="en-GB" dirty="0"/>
+              <a:t>Further optimisation for external noise immunity (LVMC capable)</a:t>
+            </a:r>
+          </a:p>
+          <a:p>
+            <a:r>
+              <a:rPr lang="en-GB" dirty="0"/>
+              <a:t>and EMC</a:t>
+            </a:r>
+          </a:p>
+          <a:p>
+            <a:r>
+              <a:rPr lang="en-GB" dirty="0"/>
+              <a:t>Custom board, etc…</a:t>
+            </a:r>
+          </a:p>
+          <a:p>
+            <a:endParaRPr lang="en-GB" dirty="0"/>
+          </a:p>
+        </p:txBody>
+      </p:sp>
+    </p:spTree>
+    <p:extLst>
+      <p:ext uri="{BB962C8B-B14F-4D97-AF65-F5344CB8AC3E}">
+        <p14:creationId xmlns:p14="http://schemas.microsoft.com/office/powerpoint/2010/main" val="715928076"/>
+      </p:ext>
+    </p:extLst>
+  </p:cSld>
+  <p:clrMapOvr>
+    <a:masterClrMapping/>
+  </p:clrMapOvr>
+</p:sld>
+</file>
+
+<file path=ppt/slides/slide6.xml><?xml version="1.0" encoding="utf-8"?>
+<p:sld xmlns:a="http://schemas.openxmlformats.org/drawingml/2006/main" xmlns:r="http://schemas.openxmlformats.org/officeDocument/2006/relationships" xmlns:p="http://schemas.openxmlformats.org/presentationml/2006/main">
+  <p:cSld>
+    <p:spTree>
+      <p:nvGrpSpPr>
+        <p:cNvPr id="1" name=""/>
+        <p:cNvGrpSpPr/>
+        <p:nvPr/>
+      </p:nvGrpSpPr>
+      <p:grpSpPr>
+        <a:xfrm>
+          <a:off x="0" y="0"/>
+          <a:ext cx="0" cy="0"/>
+          <a:chOff x="0" y="0"/>
+          <a:chExt cx="0" cy="0"/>
+        </a:xfrm>
+      </p:grpSpPr>
+      <p:sp>
+        <p:nvSpPr>
+          <p:cNvPr id="2" name="Title 1">
+            <a:extLst>
+              <a:ext uri="{FF2B5EF4-FFF2-40B4-BE49-F238E27FC236}">
+                <a16:creationId xmlns:a16="http://schemas.microsoft.com/office/drawing/2014/main" id="{DB56B872-26E3-4DEE-80D3-31074F8F3DBF}"/>
+              </a:ext>
+            </a:extLst>
+          </p:cNvPr>
+          <p:cNvSpPr>
+            <a:spLocks noGrp="1"/>
+          </p:cNvSpPr>
+          <p:nvPr>
+            <p:ph type="title"/>
+          </p:nvPr>
+        </p:nvSpPr>
+        <p:spPr/>
+        <p:txBody>
+          <a:bodyPr/>
+          <a:lstStyle/>
+          <a:p>
+            <a:r>
+              <a:rPr lang="en-GB" dirty="0"/>
+              <a:t>Storage click modules</a:t>
+            </a:r>
+          </a:p>
+        </p:txBody>
+      </p:sp>
+      <p:sp>
+        <p:nvSpPr>
+          <p:cNvPr id="3" name="Content Placeholder 2">
+            <a:extLst>
+              <a:ext uri="{FF2B5EF4-FFF2-40B4-BE49-F238E27FC236}">
+                <a16:creationId xmlns:a16="http://schemas.microsoft.com/office/drawing/2014/main" id="{49310E10-20B2-4095-B52E-F0DE4504C9A0}"/>
+              </a:ext>
+            </a:extLst>
+          </p:cNvPr>
+          <p:cNvSpPr>
+            <a:spLocks noGrp="1"/>
+          </p:cNvSpPr>
+          <p:nvPr>
+            <p:ph sz="quarter" idx="13"/>
+          </p:nvPr>
+        </p:nvSpPr>
+        <p:spPr/>
+        <p:txBody>
+          <a:bodyPr>
+            <a:normAutofit/>
+          </a:bodyPr>
+          <a:lstStyle/>
+          <a:p>
+            <a:pPr marL="342900" lvl="0" indent="-342900">
+              <a:buFont typeface="Symbol" panose="05050102010706020507" pitchFamily="18" charset="2"/>
+              <a:buChar char=""/>
+            </a:pPr>
+            <a:r>
+              <a:rPr lang="en-GB" sz="1600" dirty="0">
+                <a:effectLst/>
+                <a:latin typeface="Calibri" panose="020F0502020204030204" pitchFamily="34" charset="0"/>
+                <a:ea typeface="Times New Roman" panose="02020603050405020304" pitchFamily="18" charset="0"/>
+              </a:rPr>
+              <a:t>FLASH 5 CLICK (1Gbit)</a:t>
+            </a:r>
+            <a:endParaRPr lang="en-GB" sz="1600" dirty="0">
+              <a:effectLst/>
+              <a:latin typeface="Calibri" panose="020F0502020204030204" pitchFamily="34" charset="0"/>
+              <a:ea typeface="Calibri" panose="020F0502020204030204" pitchFamily="34" charset="0"/>
+            </a:endParaRPr>
+          </a:p>
+          <a:p>
+            <a:pPr marL="742950" lvl="1" indent="-285750">
+              <a:buFont typeface="Courier New" panose="02070309020205020404" pitchFamily="49" charset="0"/>
+              <a:buChar char="o"/>
+            </a:pPr>
+            <a:r>
+              <a:rPr lang="en-GB" sz="1600" dirty="0">
+                <a:effectLst/>
+                <a:latin typeface="Calibri" panose="020F0502020204030204" pitchFamily="34" charset="0"/>
+                <a:ea typeface="Times New Roman" panose="02020603050405020304" pitchFamily="18" charset="0"/>
+              </a:rPr>
+              <a:t>PID: MIKROE-3780</a:t>
+            </a:r>
+            <a:endParaRPr lang="en-GB" sz="1600" dirty="0">
+              <a:effectLst/>
+              <a:latin typeface="Calibri" panose="020F0502020204030204" pitchFamily="34" charset="0"/>
+              <a:ea typeface="Calibri" panose="020F0502020204030204" pitchFamily="34" charset="0"/>
+            </a:endParaRPr>
+          </a:p>
+          <a:p>
+            <a:pPr marL="742950" lvl="1" indent="-285750">
+              <a:buFont typeface="Courier New" panose="02070309020205020404" pitchFamily="49" charset="0"/>
+              <a:buChar char="o"/>
+            </a:pPr>
+            <a:r>
+              <a:rPr lang="en-GB" sz="1600" u="sng" dirty="0">
+                <a:solidFill>
+                  <a:srgbClr val="0563C1"/>
+                </a:solidFill>
+                <a:effectLst/>
+                <a:latin typeface="Calibri" panose="020F0502020204030204" pitchFamily="34" charset="0"/>
+                <a:ea typeface="Times New Roman" panose="02020603050405020304" pitchFamily="18" charset="0"/>
+                <a:hlinkClick r:id="rId2"/>
+              </a:rPr>
+              <a:t>https://www.mikroe.com/flash-5-click</a:t>
+            </a:r>
+            <a:endParaRPr lang="en-GB" sz="1600" u="sng" dirty="0">
+              <a:solidFill>
+                <a:srgbClr val="0563C1"/>
+              </a:solidFill>
+              <a:effectLst/>
+              <a:latin typeface="Calibri" panose="020F0502020204030204" pitchFamily="34" charset="0"/>
+              <a:ea typeface="Times New Roman" panose="02020603050405020304" pitchFamily="18" charset="0"/>
+            </a:endParaRPr>
+          </a:p>
+          <a:p>
+            <a:pPr marL="742950" lvl="1" indent="-285750">
+              <a:buFont typeface="Courier New" panose="02070309020205020404" pitchFamily="49" charset="0"/>
+              <a:buChar char="o"/>
+            </a:pPr>
+            <a:r>
+              <a:rPr lang="en-GB" sz="1600" dirty="0">
+                <a:solidFill>
+                  <a:schemeClr val="tx1"/>
+                </a:solidFill>
+                <a:latin typeface="Calibri" panose="020F0502020204030204" pitchFamily="34" charset="0"/>
+                <a:ea typeface="Calibri" panose="020F0502020204030204" pitchFamily="34" charset="0"/>
+              </a:rPr>
+              <a:t>Winbond Electronics W25N01GVZEIG/IT</a:t>
+            </a:r>
+          </a:p>
+          <a:p>
+            <a:pPr marL="742950" lvl="1" indent="-285750">
+              <a:buFont typeface="Courier New" panose="02070309020205020404" pitchFamily="49" charset="0"/>
+              <a:buChar char="o"/>
+            </a:pPr>
+            <a:endParaRPr lang="en-GB" sz="1600" dirty="0">
+              <a:effectLst/>
+              <a:latin typeface="Calibri" panose="020F0502020204030204" pitchFamily="34" charset="0"/>
+              <a:ea typeface="Calibri" panose="020F0502020204030204" pitchFamily="34" charset="0"/>
+            </a:endParaRPr>
+          </a:p>
+          <a:p>
+            <a:pPr marL="342900" lvl="0" indent="-342900">
+              <a:buFont typeface="Symbol" panose="05050102010706020507" pitchFamily="18" charset="2"/>
+              <a:buChar char=""/>
+            </a:pPr>
+            <a:r>
+              <a:rPr lang="en-GB" sz="1600" dirty="0">
+                <a:effectLst/>
+                <a:latin typeface="Calibri" panose="020F0502020204030204" pitchFamily="34" charset="0"/>
+                <a:ea typeface="Times New Roman" panose="02020603050405020304" pitchFamily="18" charset="0"/>
+              </a:rPr>
+              <a:t>FLASH 2 CLICK (64Mbit) MCHP</a:t>
+            </a:r>
+            <a:endParaRPr lang="en-GB" sz="1600" dirty="0">
+              <a:effectLst/>
+              <a:latin typeface="Calibri" panose="020F0502020204030204" pitchFamily="34" charset="0"/>
+              <a:ea typeface="Calibri" panose="020F0502020204030204" pitchFamily="34" charset="0"/>
+            </a:endParaRPr>
+          </a:p>
+          <a:p>
+            <a:pPr marL="742950" lvl="1" indent="-285750">
+              <a:buFont typeface="Courier New" panose="02070309020205020404" pitchFamily="49" charset="0"/>
+              <a:buChar char="o"/>
+            </a:pPr>
+            <a:r>
+              <a:rPr lang="en-GB" sz="1600" dirty="0">
+                <a:effectLst/>
+                <a:latin typeface="Calibri" panose="020F0502020204030204" pitchFamily="34" charset="0"/>
+                <a:ea typeface="Times New Roman" panose="02020603050405020304" pitchFamily="18" charset="0"/>
+              </a:rPr>
+              <a:t>PID: MIKROE-2267</a:t>
+            </a:r>
+            <a:endParaRPr lang="en-GB" sz="1600" dirty="0">
+              <a:effectLst/>
+              <a:latin typeface="Calibri" panose="020F0502020204030204" pitchFamily="34" charset="0"/>
+              <a:ea typeface="Calibri" panose="020F0502020204030204" pitchFamily="34" charset="0"/>
+            </a:endParaRPr>
+          </a:p>
+          <a:p>
+            <a:pPr marL="742950" lvl="1" indent="-285750">
+              <a:buFont typeface="Courier New" panose="02070309020205020404" pitchFamily="49" charset="0"/>
+              <a:buChar char="o"/>
+            </a:pPr>
+            <a:r>
+              <a:rPr lang="en-GB" sz="1600" u="sng" dirty="0">
+                <a:solidFill>
+                  <a:srgbClr val="0563C1"/>
+                </a:solidFill>
+                <a:effectLst/>
+                <a:latin typeface="Calibri" panose="020F0502020204030204" pitchFamily="34" charset="0"/>
+                <a:ea typeface="Times New Roman" panose="02020603050405020304" pitchFamily="18" charset="0"/>
+                <a:hlinkClick r:id="rId3"/>
+              </a:rPr>
+              <a:t>https://www.mikroe.com/flash-2-click</a:t>
+            </a:r>
+            <a:endParaRPr lang="en-GB" sz="1600" u="sng" dirty="0">
+              <a:solidFill>
+                <a:srgbClr val="0563C1"/>
+              </a:solidFill>
+              <a:effectLst/>
+              <a:latin typeface="Calibri" panose="020F0502020204030204" pitchFamily="34" charset="0"/>
+              <a:ea typeface="Times New Roman" panose="02020603050405020304" pitchFamily="18" charset="0"/>
+            </a:endParaRPr>
+          </a:p>
+          <a:p>
+            <a:pPr marL="742950" lvl="1" indent="-285750">
+              <a:buFont typeface="Courier New" panose="02070309020205020404" pitchFamily="49" charset="0"/>
+              <a:buChar char="o"/>
+            </a:pPr>
+            <a:r>
+              <a:rPr lang="en-GB" sz="1600" dirty="0">
+                <a:solidFill>
+                  <a:schemeClr val="tx1"/>
+                </a:solidFill>
+                <a:latin typeface="Calibri" panose="020F0502020204030204" pitchFamily="34" charset="0"/>
+                <a:ea typeface="Calibri" panose="020F0502020204030204" pitchFamily="34" charset="0"/>
+              </a:rPr>
+              <a:t>Microchip Technology SST26VF064B</a:t>
+            </a:r>
+          </a:p>
+          <a:p>
+            <a:pPr marL="742950" lvl="1" indent="-285750">
+              <a:buFont typeface="Courier New" panose="02070309020205020404" pitchFamily="49" charset="0"/>
+              <a:buChar char="o"/>
+            </a:pPr>
+            <a:r>
+              <a:rPr lang="en-GB" sz="1600" dirty="0">
+                <a:solidFill>
+                  <a:schemeClr val="tx1"/>
+                </a:solidFill>
+                <a:effectLst/>
+                <a:latin typeface="Calibri" panose="020F0502020204030204" pitchFamily="34" charset="0"/>
+                <a:ea typeface="Calibri" panose="020F0502020204030204" pitchFamily="34" charset="0"/>
+              </a:rPr>
+              <a:t>Compression needed (Decoder implementation)</a:t>
+            </a:r>
+          </a:p>
+          <a:p>
+            <a:pPr marL="457200" lvl="1" indent="0">
+              <a:buNone/>
+            </a:pPr>
+            <a:endParaRPr lang="en-GB" sz="1600" dirty="0">
+              <a:solidFill>
+                <a:schemeClr val="tx1"/>
+              </a:solidFill>
+              <a:effectLst/>
+              <a:latin typeface="Calibri" panose="020F0502020204030204" pitchFamily="34" charset="0"/>
+              <a:ea typeface="Calibri" panose="020F0502020204030204" pitchFamily="34" charset="0"/>
+            </a:endParaRPr>
+          </a:p>
+          <a:p>
+            <a:pPr marL="342900" lvl="0" indent="-342900">
+              <a:buFont typeface="Symbol" panose="05050102010706020507" pitchFamily="18" charset="2"/>
+              <a:buChar char=""/>
+            </a:pPr>
+            <a:r>
+              <a:rPr lang="en-GB" sz="1600" dirty="0">
+                <a:effectLst/>
+                <a:latin typeface="Calibri" panose="020F0502020204030204" pitchFamily="34" charset="0"/>
+                <a:ea typeface="Times New Roman" panose="02020603050405020304" pitchFamily="18" charset="0"/>
+              </a:rPr>
+              <a:t>MICROSD CLICK</a:t>
+            </a:r>
+            <a:endParaRPr lang="en-GB" sz="1600" dirty="0">
+              <a:effectLst/>
+              <a:latin typeface="Calibri" panose="020F0502020204030204" pitchFamily="34" charset="0"/>
+              <a:ea typeface="Calibri" panose="020F0502020204030204" pitchFamily="34" charset="0"/>
+            </a:endParaRPr>
+          </a:p>
+          <a:p>
+            <a:pPr marL="742950" lvl="1" indent="-285750">
+              <a:buFont typeface="Courier New" panose="02070309020205020404" pitchFamily="49" charset="0"/>
+              <a:buChar char="o"/>
+            </a:pPr>
+            <a:r>
+              <a:rPr lang="en-GB" sz="1600" dirty="0">
+                <a:effectLst/>
+                <a:latin typeface="Calibri" panose="020F0502020204030204" pitchFamily="34" charset="0"/>
+                <a:ea typeface="Times New Roman" panose="02020603050405020304" pitchFamily="18" charset="0"/>
+              </a:rPr>
+              <a:t>PID: MIKROE-924</a:t>
+            </a:r>
+            <a:endParaRPr lang="en-GB" sz="1600" dirty="0">
+              <a:effectLst/>
+              <a:latin typeface="Calibri" panose="020F0502020204030204" pitchFamily="34" charset="0"/>
+              <a:ea typeface="Calibri" panose="020F0502020204030204" pitchFamily="34" charset="0"/>
+            </a:endParaRPr>
+          </a:p>
+          <a:p>
+            <a:pPr marL="742950" lvl="1" indent="-285750">
+              <a:buFont typeface="Courier New" panose="02070309020205020404" pitchFamily="49" charset="0"/>
+              <a:buChar char="o"/>
+            </a:pPr>
+            <a:r>
+              <a:rPr lang="en-GB" sz="1600" u="sng" dirty="0">
+                <a:solidFill>
+                  <a:srgbClr val="0563C1"/>
+                </a:solidFill>
+                <a:effectLst/>
+                <a:latin typeface="Calibri" panose="020F0502020204030204" pitchFamily="34" charset="0"/>
+                <a:ea typeface="Times New Roman" panose="02020603050405020304" pitchFamily="18" charset="0"/>
+                <a:hlinkClick r:id="rId4"/>
+              </a:rPr>
+              <a:t>https://www.mikroe.com/microsd-click</a:t>
+            </a:r>
+            <a:endParaRPr lang="en-GB" sz="1600" u="sng" dirty="0">
+              <a:solidFill>
+                <a:srgbClr val="0563C1"/>
+              </a:solidFill>
+              <a:effectLst/>
+              <a:latin typeface="Calibri" panose="020F0502020204030204" pitchFamily="34" charset="0"/>
+              <a:ea typeface="Times New Roman" panose="02020603050405020304" pitchFamily="18" charset="0"/>
+            </a:endParaRPr>
+          </a:p>
+          <a:p>
+            <a:pPr marL="742950" lvl="1" indent="-285750">
+              <a:buFont typeface="Courier New" panose="02070309020205020404" pitchFamily="49" charset="0"/>
+              <a:buChar char="o"/>
+            </a:pPr>
+            <a:r>
+              <a:rPr lang="en-GB" sz="1600" dirty="0">
+                <a:solidFill>
+                  <a:schemeClr val="tx1"/>
+                </a:solidFill>
+                <a:latin typeface="Calibri" panose="020F0502020204030204" pitchFamily="34" charset="0"/>
+                <a:ea typeface="Calibri" panose="020F0502020204030204" pitchFamily="34" charset="0"/>
+              </a:rPr>
+              <a:t>Most flexible for storage size</a:t>
+            </a:r>
+          </a:p>
+          <a:p>
+            <a:pPr marL="742950" lvl="1" indent="-285750">
+              <a:buFont typeface="Courier New" panose="02070309020205020404" pitchFamily="49" charset="0"/>
+              <a:buChar char="o"/>
+            </a:pPr>
+            <a:r>
+              <a:rPr lang="en-GB" sz="1600" dirty="0">
+                <a:solidFill>
+                  <a:schemeClr val="tx1"/>
+                </a:solidFill>
+                <a:latin typeface="Calibri" panose="020F0502020204030204" pitchFamily="34" charset="0"/>
+                <a:ea typeface="Calibri" panose="020F0502020204030204" pitchFamily="34" charset="0"/>
+              </a:rPr>
+              <a:t>Writing data to SD is the easiest/fastest</a:t>
+            </a:r>
+          </a:p>
+          <a:p>
+            <a:pPr marL="742950" lvl="1" indent="-285750">
+              <a:buFont typeface="Courier New" panose="02070309020205020404" pitchFamily="49" charset="0"/>
+              <a:buChar char="o"/>
+            </a:pPr>
+            <a:r>
+              <a:rPr lang="en-GB" sz="1600" dirty="0">
+                <a:solidFill>
+                  <a:schemeClr val="tx1"/>
+                </a:solidFill>
+                <a:effectLst/>
+                <a:latin typeface="Calibri" panose="020F0502020204030204" pitchFamily="34" charset="0"/>
+                <a:ea typeface="Calibri" panose="020F0502020204030204" pitchFamily="34" charset="0"/>
+              </a:rPr>
+              <a:t>Probably best for fast </a:t>
+            </a:r>
+            <a:r>
+              <a:rPr lang="en-GB" sz="1600" dirty="0" err="1">
+                <a:solidFill>
+                  <a:schemeClr val="tx1"/>
+                </a:solidFill>
+                <a:effectLst/>
+                <a:latin typeface="Calibri" panose="020F0502020204030204" pitchFamily="34" charset="0"/>
+                <a:ea typeface="Calibri" panose="020F0502020204030204" pitchFamily="34" charset="0"/>
+              </a:rPr>
+              <a:t>PoC</a:t>
+            </a:r>
+            <a:r>
+              <a:rPr lang="en-GB" sz="1600" dirty="0">
+                <a:solidFill>
+                  <a:schemeClr val="tx1"/>
+                </a:solidFill>
+                <a:effectLst/>
+                <a:latin typeface="Calibri" panose="020F0502020204030204" pitchFamily="34" charset="0"/>
+                <a:ea typeface="Calibri" panose="020F0502020204030204" pitchFamily="34" charset="0"/>
+              </a:rPr>
+              <a:t> result</a:t>
+            </a:r>
+          </a:p>
+        </p:txBody>
+      </p:sp>
+      <p:pic>
+        <p:nvPicPr>
+          <p:cNvPr id="1026" name="Picture 2" descr="Shop Click Boards Storage Flash 5 Click Front">
+            <a:extLst>
+              <a:ext uri="{FF2B5EF4-FFF2-40B4-BE49-F238E27FC236}">
+                <a16:creationId xmlns:a16="http://schemas.microsoft.com/office/drawing/2014/main" id="{27495E9C-BC14-4E6A-B556-BA8D3A47080B}"/>
+              </a:ext>
+            </a:extLst>
+          </p:cNvPr>
+          <p:cNvPicPr>
+            <a:picLocks noChangeAspect="1" noChangeArrowheads="1"/>
+          </p:cNvPicPr>
+          <p:nvPr/>
+        </p:nvPicPr>
+        <p:blipFill rotWithShape="1">
+          <a:blip r:embed="rId5">
+            <a:extLst>
+              <a:ext uri="{28A0092B-C50C-407E-A947-70E740481C1C}">
+                <a14:useLocalDpi xmlns:a14="http://schemas.microsoft.com/office/drawing/2010/main" val="0"/>
+              </a:ext>
+            </a:extLst>
+          </a:blip>
+          <a:srcRect l="26021" t="48348" r="23817" b="2841"/>
+          <a:stretch/>
+        </p:blipFill>
+        <p:spPr bwMode="auto">
+          <a:xfrm>
+            <a:off x="8273522" y="512567"/>
+            <a:ext cx="2245660" cy="2185147"/>
+          </a:xfrm>
+          <a:prstGeom prst="rect">
+            <a:avLst/>
+          </a:prstGeom>
+          <a:noFill/>
+          <a:extLst>
+            <a:ext uri="{909E8E84-426E-40DD-AFC4-6F175D3DCCD1}">
+              <a14:hiddenFill xmlns:a14="http://schemas.microsoft.com/office/drawing/2010/main">
+                <a:solidFill>
+                  <a:srgbClr val="FFFFFF"/>
+                </a:solidFill>
+              </a14:hiddenFill>
+            </a:ext>
+          </a:extLst>
+        </p:spPr>
+      </p:pic>
+      <p:pic>
+        <p:nvPicPr>
+          <p:cNvPr id="1028" name="Picture 4" descr="Mikroe Storage Flash 2 click front">
+            <a:extLst>
+              <a:ext uri="{FF2B5EF4-FFF2-40B4-BE49-F238E27FC236}">
+                <a16:creationId xmlns:a16="http://schemas.microsoft.com/office/drawing/2014/main" id="{338147BD-2B8C-4236-B416-54372CD12546}"/>
+              </a:ext>
+            </a:extLst>
+          </p:cNvPr>
+          <p:cNvPicPr>
+            <a:picLocks noChangeAspect="1" noChangeArrowheads="1"/>
+          </p:cNvPicPr>
+          <p:nvPr/>
+        </p:nvPicPr>
+        <p:blipFill rotWithShape="1">
+          <a:blip r:embed="rId6">
+            <a:extLst>
+              <a:ext uri="{28A0092B-C50C-407E-A947-70E740481C1C}">
+                <a14:useLocalDpi xmlns:a14="http://schemas.microsoft.com/office/drawing/2010/main" val="0"/>
+              </a:ext>
+            </a:extLst>
+          </a:blip>
+          <a:srcRect l="28026" t="46883" r="29398"/>
+          <a:stretch/>
+        </p:blipFill>
+        <p:spPr bwMode="auto">
+          <a:xfrm>
+            <a:off x="6495803" y="1989116"/>
+            <a:ext cx="1905990" cy="2377910"/>
+          </a:xfrm>
+          <a:prstGeom prst="rect">
+            <a:avLst/>
+          </a:prstGeom>
+          <a:noFill/>
+          <a:extLst>
+            <a:ext uri="{909E8E84-426E-40DD-AFC4-6F175D3DCCD1}">
+              <a14:hiddenFill xmlns:a14="http://schemas.microsoft.com/office/drawing/2010/main">
+                <a:solidFill>
+                  <a:srgbClr val="FFFFFF"/>
+                </a:solidFill>
+              </a14:hiddenFill>
+            </a:ext>
+          </a:extLst>
+        </p:spPr>
+      </p:pic>
+      <p:pic>
+        <p:nvPicPr>
+          <p:cNvPr id="1030" name="Picture 6" descr="microSD click front">
+            <a:extLst>
+              <a:ext uri="{FF2B5EF4-FFF2-40B4-BE49-F238E27FC236}">
+                <a16:creationId xmlns:a16="http://schemas.microsoft.com/office/drawing/2014/main" id="{0371588B-5607-442D-9876-B95D42706E62}"/>
+              </a:ext>
+            </a:extLst>
+          </p:cNvPr>
+          <p:cNvPicPr>
+            <a:picLocks noChangeAspect="1" noChangeArrowheads="1"/>
+          </p:cNvPicPr>
+          <p:nvPr/>
+        </p:nvPicPr>
+        <p:blipFill rotWithShape="1">
+          <a:blip r:embed="rId7">
+            <a:extLst>
+              <a:ext uri="{28A0092B-C50C-407E-A947-70E740481C1C}">
+                <a14:useLocalDpi xmlns:a14="http://schemas.microsoft.com/office/drawing/2010/main" val="0"/>
+              </a:ext>
+            </a:extLst>
+          </a:blip>
+          <a:srcRect l="28027" t="48475" r="27540"/>
+          <a:stretch/>
+        </p:blipFill>
+        <p:spPr bwMode="auto">
+          <a:xfrm>
+            <a:off x="8401793" y="3889169"/>
+            <a:ext cx="1989117" cy="2306658"/>
+          </a:xfrm>
+          <a:prstGeom prst="rect">
+            <a:avLst/>
+          </a:prstGeom>
+          <a:noFill/>
+          <a:extLst>
+            <a:ext uri="{909E8E84-426E-40DD-AFC4-6F175D3DCCD1}">
+              <a14:hiddenFill xmlns:a14="http://schemas.microsoft.com/office/drawing/2010/main">
+                <a:solidFill>
+                  <a:srgbClr val="FFFFFF"/>
+                </a:solidFill>
+              </a14:hiddenFill>
+            </a:ext>
+          </a:extLst>
+        </p:spPr>
+      </p:pic>
+    </p:spTree>
+    <p:extLst>
+      <p:ext uri="{BB962C8B-B14F-4D97-AF65-F5344CB8AC3E}">
+        <p14:creationId xmlns:p14="http://schemas.microsoft.com/office/powerpoint/2010/main" val="3034666895"/>
+      </p:ext>
+    </p:extLst>
+  </p:cSld>
+  <p:clrMapOvr>
+    <a:masterClrMapping/>
+  </p:clrMapOvr>
+</p:sld>
+</file>
+
+<file path=ppt/slides/slide7.xml><?xml version="1.0" encoding="utf-8"?>
+<p:sld xmlns:a="http://schemas.openxmlformats.org/drawingml/2006/main" xmlns:r="http://schemas.openxmlformats.org/officeDocument/2006/relationships" xmlns:p="http://schemas.openxmlformats.org/presentationml/2006/main">
+  <p:cSld>
+    <p:spTree>
+      <p:nvGrpSpPr>
+        <p:cNvPr id="1" name=""/>
+        <p:cNvGrpSpPr/>
+        <p:nvPr/>
+      </p:nvGrpSpPr>
+      <p:grpSpPr>
+        <a:xfrm>
+          <a:off x="0" y="0"/>
+          <a:ext cx="0" cy="0"/>
+          <a:chOff x="0" y="0"/>
+          <a:chExt cx="0" cy="0"/>
+        </a:xfrm>
+      </p:grpSpPr>
       <p:sp>
         <p:nvSpPr>
           <p:cNvPr id="2" name="Title 1">
@@ -4760,7 +6506,7 @@
 </p:sld>
 </file>
 
-<file path=ppt/slides/slide5.xml><?xml version="1.0" encoding="utf-8"?>
+<file path=ppt/slides/slide8.xml><?xml version="1.0" encoding="utf-8"?>
 <p:sld xmlns:a="http://schemas.openxmlformats.org/drawingml/2006/main" xmlns:r="http://schemas.openxmlformats.org/officeDocument/2006/relationships" xmlns:p="http://schemas.openxmlformats.org/presentationml/2006/main">
   <p:cSld>
     <p:spTree>

</xml_diff>